<commit_message>
Added FPLB class diagram
</commit_message>
<xml_diff>
--- a/docs/presentation/presentation.pptx
+++ b/docs/presentation/presentation.pptx
@@ -10295,80 +10295,41 @@
           <a:effectLst/>
         </p:spPr>
       </p:pic>
-      <p:sp>
-        <p:nvSpPr>
-          <p:cNvPr id="10" name="Объект 2">
-            <a:extLst>
-              <a:ext uri="{FF2B5EF4-FFF2-40B4-BE49-F238E27FC236}">
-                <a16:creationId xmlns:a16="http://schemas.microsoft.com/office/drawing/2014/main" id="{80E79F5E-74A1-452D-AB16-BD2296240918}"/>
-              </a:ext>
-            </a:extLst>
-          </p:cNvPr>
-          <p:cNvSpPr>
-            <a:spLocks noGrp="1"/>
-          </p:cNvSpPr>
+      <p:pic>
+        <p:nvPicPr>
+          <p:cNvPr id="18" name="Content Placeholder 17">
+            <a:extLst>
+              <a:ext uri="{FF2B5EF4-FFF2-40B4-BE49-F238E27FC236}">
+                <a16:creationId xmlns:a16="http://schemas.microsoft.com/office/drawing/2014/main" id="{E0B9D570-6731-44BB-AC1E-9D7F60B6DAFA}"/>
+              </a:ext>
+            </a:extLst>
+          </p:cNvPr>
+          <p:cNvPicPr>
+            <a:picLocks noGrp="1" noChangeAspect="1"/>
+          </p:cNvPicPr>
           <p:nvPr>
             <p:ph idx="1"/>
           </p:nvPr>
-        </p:nvSpPr>
+        </p:nvPicPr>
+        <p:blipFill>
+          <a:blip r:embed="rId5">
+            <a:extLst>
+              <a:ext uri="{28A0092B-C50C-407E-A947-70E740481C1C}">
+                <a14:useLocalDpi xmlns:a14="http://schemas.microsoft.com/office/drawing/2010/main" val="0"/>
+              </a:ext>
+            </a:extLst>
+          </a:blip>
+          <a:stretch>
+            <a:fillRect/>
+          </a:stretch>
+        </p:blipFill>
         <p:spPr>
           <a:xfrm>
-            <a:off x="489335" y="1373475"/>
-            <a:ext cx="11369040" cy="4838194"/>
+            <a:off x="274545" y="2108859"/>
+            <a:ext cx="11642910" cy="3377542"/>
           </a:xfrm>
         </p:spPr>
-        <p:txBody>
-          <a:bodyPr>
-            <a:noAutofit/>
-          </a:bodyPr>
-          <a:lstStyle/>
-          <a:p>
-            <a:pPr marL="0" indent="0">
-              <a:buNone/>
-            </a:pPr>
-            <a:r>
-              <a:rPr lang="ru-RU" sz="2000" dirty="0">
-                <a:latin typeface="Helvetica Neue" panose="02000503000000020004" pitchFamily="2" charset="0"/>
-                <a:ea typeface="Helvetica Neue" panose="02000503000000020004" pitchFamily="2" charset="0"/>
-                <a:cs typeface="Helvetica Neue" panose="02000503000000020004" pitchFamily="2" charset="0"/>
-              </a:rPr>
-              <a:t>Архитектура ПО (</a:t>
-            </a:r>
-            <a:r>
-              <a:rPr lang="en-US" sz="2000" dirty="0">
-                <a:latin typeface="Helvetica Neue" panose="02000503000000020004" pitchFamily="2" charset="0"/>
-                <a:ea typeface="Helvetica Neue" panose="02000503000000020004" pitchFamily="2" charset="0"/>
-                <a:cs typeface="Helvetica Neue" panose="02000503000000020004" pitchFamily="2" charset="0"/>
-              </a:rPr>
-              <a:t>UML </a:t>
-            </a:r>
-            <a:r>
-              <a:rPr lang="ru-RU" sz="2000" dirty="0">
-                <a:latin typeface="Helvetica Neue" panose="02000503000000020004" pitchFamily="2" charset="0"/>
-                <a:ea typeface="Helvetica Neue" panose="02000503000000020004" pitchFamily="2" charset="0"/>
-                <a:cs typeface="Helvetica Neue" panose="02000503000000020004" pitchFamily="2" charset="0"/>
-              </a:rPr>
-              <a:t>или </a:t>
-            </a:r>
-            <a:r>
-              <a:rPr lang="ru-RU" sz="2000" dirty="0" err="1">
-                <a:latin typeface="Helvetica Neue" panose="02000503000000020004" pitchFamily="2" charset="0"/>
-                <a:ea typeface="Helvetica Neue" panose="02000503000000020004" pitchFamily="2" charset="0"/>
-                <a:cs typeface="Helvetica Neue" panose="02000503000000020004" pitchFamily="2" charset="0"/>
-              </a:rPr>
-              <a:t>типо</a:t>
-            </a:r>
-            <a:r>
-              <a:rPr lang="ru-RU" sz="2000" dirty="0">
-                <a:latin typeface="Helvetica Neue" panose="02000503000000020004" pitchFamily="2" charset="0"/>
-                <a:ea typeface="Helvetica Neue" panose="02000503000000020004" pitchFamily="2" charset="0"/>
-                <a:cs typeface="Helvetica Neue" panose="02000503000000020004" pitchFamily="2" charset="0"/>
-              </a:rPr>
-              <a:t> того)</a:t>
-            </a:r>
-          </a:p>
-        </p:txBody>
-      </p:sp>
+      </p:pic>
     </p:spTree>
     <p:extLst>
       <p:ext uri="{BB962C8B-B14F-4D97-AF65-F5344CB8AC3E}">

</xml_diff>

<commit_message>
Fixed design and added qr code
</commit_message>
<xml_diff>
--- a/docs/presentation/presentation.pptx
+++ b/docs/presentation/presentation.pptx
@@ -5,10 +5,10 @@
     <p:sldMasterId id="2147483648" r:id="rId1"/>
   </p:sldMasterIdLst>
   <p:notesMasterIdLst>
-    <p:notesMasterId r:id="rId13"/>
+    <p:notesMasterId r:id="rId14"/>
   </p:notesMasterIdLst>
   <p:handoutMasterIdLst>
-    <p:handoutMasterId r:id="rId14"/>
+    <p:handoutMasterId r:id="rId15"/>
   </p:handoutMasterIdLst>
   <p:sldIdLst>
     <p:sldId id="256" r:id="rId2"/>
@@ -20,8 +20,9 @@
     <p:sldId id="297" r:id="rId8"/>
     <p:sldId id="298" r:id="rId9"/>
     <p:sldId id="299" r:id="rId10"/>
-    <p:sldId id="267" r:id="rId11"/>
-    <p:sldId id="268" r:id="rId12"/>
+    <p:sldId id="300" r:id="rId11"/>
+    <p:sldId id="267" r:id="rId12"/>
+    <p:sldId id="268" r:id="rId13"/>
   </p:sldIdLst>
   <p:sldSz cx="12192000" cy="6858000"/>
   <p:notesSz cx="6858000" cy="9144000"/>
@@ -932,7 +933,15 @@
           <a:bodyPr/>
           <a:lstStyle/>
           <a:p>
-            <a:endParaRPr lang="en-RU" dirty="0"/>
+            <a:endParaRPr lang="en-RU" sz="1200" kern="1200" dirty="0">
+              <a:solidFill>
+                <a:schemeClr val="tx1"/>
+              </a:solidFill>
+              <a:effectLst/>
+              <a:latin typeface="+mn-lt"/>
+              <a:ea typeface="+mn-ea"/>
+              <a:cs typeface="+mn-cs"/>
+            </a:endParaRPr>
           </a:p>
         </p:txBody>
       </p:sp>
@@ -962,7 +971,7 @@
     </p:spTree>
     <p:extLst>
       <p:ext uri="{BB962C8B-B14F-4D97-AF65-F5344CB8AC3E}">
-        <p14:creationId xmlns:p14="http://schemas.microsoft.com/office/powerpoint/2010/main" val="2480852342"/>
+        <p14:creationId xmlns:p14="http://schemas.microsoft.com/office/powerpoint/2010/main" val="2355718608"/>
       </p:ext>
     </p:extLst>
   </p:cSld>
@@ -1016,6 +1025,90 @@
           <a:bodyPr/>
           <a:lstStyle/>
           <a:p>
+            <a:endParaRPr lang="en-RU" dirty="0"/>
+          </a:p>
+        </p:txBody>
+      </p:sp>
+      <p:sp>
+        <p:nvSpPr>
+          <p:cNvPr id="4" name="Slide Number Placeholder 3"/>
+          <p:cNvSpPr>
+            <a:spLocks noGrp="1"/>
+          </p:cNvSpPr>
+          <p:nvPr>
+            <p:ph type="sldNum" sz="quarter" idx="5"/>
+          </p:nvPr>
+        </p:nvSpPr>
+        <p:spPr/>
+        <p:txBody>
+          <a:bodyPr/>
+          <a:lstStyle/>
+          <a:p>
+            <a:fld id="{80EA287C-F450-484E-9FD5-FC6D729DAEC8}" type="slidenum">
+              <a:rPr lang="en-RU" smtClean="0"/>
+              <a:t>11</a:t>
+            </a:fld>
+            <a:endParaRPr lang="en-RU"/>
+          </a:p>
+        </p:txBody>
+      </p:sp>
+    </p:spTree>
+    <p:extLst>
+      <p:ext uri="{BB962C8B-B14F-4D97-AF65-F5344CB8AC3E}">
+        <p14:creationId xmlns:p14="http://schemas.microsoft.com/office/powerpoint/2010/main" val="2480852342"/>
+      </p:ext>
+    </p:extLst>
+  </p:cSld>
+  <p:clrMapOvr>
+    <a:masterClrMapping/>
+  </p:clrMapOvr>
+</p:notes>
+</file>
+
+<file path=ppt/notesSlides/notesSlide12.xml><?xml version="1.0" encoding="utf-8"?>
+<p:notes xmlns:a="http://schemas.openxmlformats.org/drawingml/2006/main" xmlns:r="http://schemas.openxmlformats.org/officeDocument/2006/relationships" xmlns:p="http://schemas.openxmlformats.org/presentationml/2006/main">
+  <p:cSld>
+    <p:spTree>
+      <p:nvGrpSpPr>
+        <p:cNvPr id="1" name=""/>
+        <p:cNvGrpSpPr/>
+        <p:nvPr/>
+      </p:nvGrpSpPr>
+      <p:grpSpPr>
+        <a:xfrm>
+          <a:off x="0" y="0"/>
+          <a:ext cx="0" cy="0"/>
+          <a:chOff x="0" y="0"/>
+          <a:chExt cx="0" cy="0"/>
+        </a:xfrm>
+      </p:grpSpPr>
+      <p:sp>
+        <p:nvSpPr>
+          <p:cNvPr id="2" name="Slide Image Placeholder 1"/>
+          <p:cNvSpPr>
+            <a:spLocks noGrp="1" noRot="1" noChangeAspect="1"/>
+          </p:cNvSpPr>
+          <p:nvPr>
+            <p:ph type="sldImg"/>
+          </p:nvPr>
+        </p:nvSpPr>
+        <p:spPr/>
+      </p:sp>
+      <p:sp>
+        <p:nvSpPr>
+          <p:cNvPr id="3" name="Notes Placeholder 2"/>
+          <p:cNvSpPr>
+            <a:spLocks noGrp="1"/>
+          </p:cNvSpPr>
+          <p:nvPr>
+            <p:ph type="body" idx="1"/>
+          </p:nvPr>
+        </p:nvSpPr>
+        <p:spPr/>
+        <p:txBody>
+          <a:bodyPr/>
+          <a:lstStyle/>
+          <a:p>
             <a:endParaRPr lang="en-RU" sz="1200" kern="1200" dirty="0">
               <a:solidFill>
                 <a:schemeClr val="tx1"/>
@@ -1045,7 +1138,7 @@
           <a:p>
             <a:fld id="{80EA287C-F450-484E-9FD5-FC6D729DAEC8}" type="slidenum">
               <a:rPr lang="en-RU" smtClean="0"/>
-              <a:t>11</a:t>
+              <a:t>12</a:t>
             </a:fld>
             <a:endParaRPr lang="en-RU"/>
           </a:p>
@@ -5586,7 +5679,7 @@
           <p:cNvPr id="5" name="Slide Number Placeholder 4">
             <a:extLst>
               <a:ext uri="{FF2B5EF4-FFF2-40B4-BE49-F238E27FC236}">
-                <a16:creationId xmlns:a16="http://schemas.microsoft.com/office/drawing/2014/main" id="{FA23F4B6-34F6-5F49-8575-0B830127F0BA}"/>
+                <a16:creationId xmlns:a16="http://schemas.microsoft.com/office/drawing/2014/main" id="{3B502563-780D-9A4C-8688-21BD4E6EF31A}"/>
               </a:ext>
             </a:extLst>
           </p:cNvPr>
@@ -5615,7 +5708,7 @@
           <p:cNvPr id="7" name="Заголовок 1">
             <a:extLst>
               <a:ext uri="{FF2B5EF4-FFF2-40B4-BE49-F238E27FC236}">
-                <a16:creationId xmlns:a16="http://schemas.microsoft.com/office/drawing/2014/main" id="{C97D02F3-B3CF-1A40-992B-3BCE54AEC322}"/>
+                <a16:creationId xmlns:a16="http://schemas.microsoft.com/office/drawing/2014/main" id="{5244247D-458B-804E-8660-B8C8BACFDC3F}"/>
               </a:ext>
             </a:extLst>
           </p:cNvPr>
@@ -5664,16 +5757,16 @@
           </a:lstStyle>
           <a:p>
             <a:r>
-              <a:rPr lang="en-US" b="1" dirty="0">
+              <a:rPr lang="en-US" sz="4000" b="1" dirty="0">
                 <a:latin typeface="+mn-lt"/>
               </a:rPr>
               <a:t>	</a:t>
             </a:r>
             <a:r>
-              <a:rPr lang="ru-RU" b="1" dirty="0">
+              <a:rPr lang="ru-RU" sz="3600" b="1" dirty="0">
                 <a:latin typeface="+mn-lt"/>
               </a:rPr>
-              <a:t>Заключение</a:t>
+              <a:t>Иерархический дескриптор конфигурации тестов</a:t>
             </a:r>
           </a:p>
         </p:txBody>
@@ -5683,7 +5776,7 @@
           <p:cNvPr id="8" name="Picture 7">
             <a:extLst>
               <a:ext uri="{FF2B5EF4-FFF2-40B4-BE49-F238E27FC236}">
-                <a16:creationId xmlns:a16="http://schemas.microsoft.com/office/drawing/2014/main" id="{E865F144-5406-EF47-B91B-14B125A33E9F}"/>
+                <a16:creationId xmlns:a16="http://schemas.microsoft.com/office/drawing/2014/main" id="{E9C1B6FE-0157-D842-B40B-5230337F328B}"/>
               </a:ext>
             </a:extLst>
           </p:cNvPr>
@@ -5719,7 +5812,7 @@
           <p:cNvPr id="9" name="Picture 8">
             <a:extLst>
               <a:ext uri="{FF2B5EF4-FFF2-40B4-BE49-F238E27FC236}">
-                <a16:creationId xmlns:a16="http://schemas.microsoft.com/office/drawing/2014/main" id="{086CDF8B-5A30-8C4F-B34E-4275A0D98BC9}"/>
+                <a16:creationId xmlns:a16="http://schemas.microsoft.com/office/drawing/2014/main" id="{C108A182-E882-F649-9105-60A469C17A4C}"/>
               </a:ext>
             </a:extLst>
           </p:cNvPr>
@@ -5751,35 +5844,10 @@
           <a:effectLst/>
         </p:spPr>
       </p:pic>
-      <p:sp>
-        <p:nvSpPr>
-          <p:cNvPr id="4" name="Content Placeholder 3">
-            <a:extLst>
-              <a:ext uri="{FF2B5EF4-FFF2-40B4-BE49-F238E27FC236}">
-                <a16:creationId xmlns:a16="http://schemas.microsoft.com/office/drawing/2014/main" id="{B5864989-CF3D-4AA0-88E2-0C0B8B6D17BC}"/>
-              </a:ext>
-            </a:extLst>
-          </p:cNvPr>
-          <p:cNvSpPr>
-            <a:spLocks noGrp="1"/>
-          </p:cNvSpPr>
-          <p:nvPr>
-            <p:ph idx="1"/>
-          </p:nvPr>
-        </p:nvSpPr>
-        <p:spPr/>
-        <p:txBody>
-          <a:bodyPr/>
-          <a:lstStyle/>
-          <a:p>
-            <a:endParaRPr lang="ru-RU"/>
-          </a:p>
-        </p:txBody>
-      </p:sp>
     </p:spTree>
     <p:extLst>
       <p:ext uri="{BB962C8B-B14F-4D97-AF65-F5344CB8AC3E}">
-        <p14:creationId xmlns:p14="http://schemas.microsoft.com/office/powerpoint/2010/main" val="4066101104"/>
+        <p14:creationId xmlns:p14="http://schemas.microsoft.com/office/powerpoint/2010/main" val="797071433"/>
       </p:ext>
     </p:extLst>
   </p:cSld>
@@ -5811,7 +5879,7 @@
           <p:cNvPr id="5" name="Slide Number Placeholder 4">
             <a:extLst>
               <a:ext uri="{FF2B5EF4-FFF2-40B4-BE49-F238E27FC236}">
-                <a16:creationId xmlns:a16="http://schemas.microsoft.com/office/drawing/2014/main" id="{AAE0A73A-0DF3-3A44-813D-3A4A08C1D621}"/>
+                <a16:creationId xmlns:a16="http://schemas.microsoft.com/office/drawing/2014/main" id="{FA23F4B6-34F6-5F49-8575-0B830127F0BA}"/>
               </a:ext>
             </a:extLst>
           </p:cNvPr>
@@ -5830,6 +5898,231 @@
             <a:fld id="{018BF65D-6ED2-4CD5-9A43-7F793B06593C}" type="slidenum">
               <a:rPr lang="ru-RU" smtClean="0"/>
               <a:t>11</a:t>
+            </a:fld>
+            <a:endParaRPr lang="ru-RU"/>
+          </a:p>
+        </p:txBody>
+      </p:sp>
+      <p:sp>
+        <p:nvSpPr>
+          <p:cNvPr id="7" name="Заголовок 1">
+            <a:extLst>
+              <a:ext uri="{FF2B5EF4-FFF2-40B4-BE49-F238E27FC236}">
+                <a16:creationId xmlns:a16="http://schemas.microsoft.com/office/drawing/2014/main" id="{C97D02F3-B3CF-1A40-992B-3BCE54AEC322}"/>
+              </a:ext>
+            </a:extLst>
+          </p:cNvPr>
+          <p:cNvSpPr txBox="1">
+            <a:spLocks/>
+          </p:cNvSpPr>
+          <p:nvPr/>
+        </p:nvSpPr>
+        <p:spPr>
+          <a:xfrm>
+            <a:off x="-1" y="-16805"/>
+            <a:ext cx="12192001" cy="941202"/>
+          </a:xfrm>
+          <a:prstGeom prst="rect">
+            <a:avLst/>
+          </a:prstGeom>
+          <a:solidFill>
+            <a:schemeClr val="accent3">
+              <a:lumMod val="20000"/>
+              <a:lumOff val="80000"/>
+            </a:schemeClr>
+          </a:solidFill>
+        </p:spPr>
+        <p:txBody>
+          <a:bodyPr vert="horz" lIns="91440" tIns="45720" rIns="91440" bIns="45720" rtlCol="0" anchor="ctr">
+            <a:normAutofit/>
+          </a:bodyPr>
+          <a:lstStyle>
+            <a:lvl1pPr algn="l" defTabSz="914400" rtl="0" eaLnBrk="1" latinLnBrk="0" hangingPunct="1">
+              <a:lnSpc>
+                <a:spcPct val="90000"/>
+              </a:lnSpc>
+              <a:spcBef>
+                <a:spcPct val="0"/>
+              </a:spcBef>
+              <a:buNone/>
+              <a:defRPr sz="4400" kern="1200">
+                <a:solidFill>
+                  <a:schemeClr val="tx1"/>
+                </a:solidFill>
+                <a:latin typeface="+mj-lt"/>
+                <a:ea typeface="+mj-ea"/>
+                <a:cs typeface="+mj-cs"/>
+              </a:defRPr>
+            </a:lvl1pPr>
+          </a:lstStyle>
+          <a:p>
+            <a:r>
+              <a:rPr lang="en-US" b="1" dirty="0">
+                <a:latin typeface="+mn-lt"/>
+              </a:rPr>
+              <a:t>	</a:t>
+            </a:r>
+            <a:r>
+              <a:rPr lang="ru-RU" b="1" dirty="0">
+                <a:latin typeface="+mn-lt"/>
+              </a:rPr>
+              <a:t>Заключение</a:t>
+            </a:r>
+          </a:p>
+        </p:txBody>
+      </p:sp>
+      <p:pic>
+        <p:nvPicPr>
+          <p:cNvPr id="8" name="Picture 7">
+            <a:extLst>
+              <a:ext uri="{FF2B5EF4-FFF2-40B4-BE49-F238E27FC236}">
+                <a16:creationId xmlns:a16="http://schemas.microsoft.com/office/drawing/2014/main" id="{E865F144-5406-EF47-B91B-14B125A33E9F}"/>
+              </a:ext>
+            </a:extLst>
+          </p:cNvPr>
+          <p:cNvPicPr>
+            <a:picLocks noChangeAspect="1"/>
+          </p:cNvPicPr>
+          <p:nvPr/>
+        </p:nvPicPr>
+        <p:blipFill>
+          <a:blip r:embed="rId3">
+            <a:extLst>
+              <a:ext uri="{28A0092B-C50C-407E-A947-70E740481C1C}">
+                <a14:useLocalDpi xmlns:a14="http://schemas.microsoft.com/office/drawing/2010/main" val="0"/>
+              </a:ext>
+            </a:extLst>
+          </a:blip>
+          <a:stretch>
+            <a:fillRect/>
+          </a:stretch>
+        </p:blipFill>
+        <p:spPr>
+          <a:xfrm>
+            <a:off x="83617" y="68686"/>
+            <a:ext cx="811437" cy="792024"/>
+          </a:xfrm>
+          <a:prstGeom prst="rect">
+            <a:avLst/>
+          </a:prstGeom>
+        </p:spPr>
+      </p:pic>
+      <p:pic>
+        <p:nvPicPr>
+          <p:cNvPr id="9" name="Picture 8">
+            <a:extLst>
+              <a:ext uri="{FF2B5EF4-FFF2-40B4-BE49-F238E27FC236}">
+                <a16:creationId xmlns:a16="http://schemas.microsoft.com/office/drawing/2014/main" id="{086CDF8B-5A30-8C4F-B34E-4275A0D98BC9}"/>
+              </a:ext>
+            </a:extLst>
+          </p:cNvPr>
+          <p:cNvPicPr>
+            <a:picLocks noChangeAspect="1"/>
+          </p:cNvPicPr>
+          <p:nvPr/>
+        </p:nvPicPr>
+        <p:blipFill>
+          <a:blip r:embed="rId4">
+            <a:extLst>
+              <a:ext uri="{28A0092B-C50C-407E-A947-70E740481C1C}">
+                <a14:useLocalDpi xmlns:a14="http://schemas.microsoft.com/office/drawing/2010/main" val="0"/>
+              </a:ext>
+            </a:extLst>
+          </a:blip>
+          <a:stretch>
+            <a:fillRect/>
+          </a:stretch>
+        </p:blipFill>
+        <p:spPr>
+          <a:xfrm>
+            <a:off x="11353800" y="37130"/>
+            <a:ext cx="697948" cy="823580"/>
+          </a:xfrm>
+          <a:prstGeom prst="rect">
+            <a:avLst/>
+          </a:prstGeom>
+          <a:effectLst/>
+        </p:spPr>
+      </p:pic>
+      <p:sp>
+        <p:nvSpPr>
+          <p:cNvPr id="4" name="Content Placeholder 3">
+            <a:extLst>
+              <a:ext uri="{FF2B5EF4-FFF2-40B4-BE49-F238E27FC236}">
+                <a16:creationId xmlns:a16="http://schemas.microsoft.com/office/drawing/2014/main" id="{B5864989-CF3D-4AA0-88E2-0C0B8B6D17BC}"/>
+              </a:ext>
+            </a:extLst>
+          </p:cNvPr>
+          <p:cNvSpPr>
+            <a:spLocks noGrp="1"/>
+          </p:cNvSpPr>
+          <p:nvPr>
+            <p:ph idx="1"/>
+          </p:nvPr>
+        </p:nvSpPr>
+        <p:spPr/>
+        <p:txBody>
+          <a:bodyPr/>
+          <a:lstStyle/>
+          <a:p>
+            <a:endParaRPr lang="ru-RU"/>
+          </a:p>
+        </p:txBody>
+      </p:sp>
+    </p:spTree>
+    <p:extLst>
+      <p:ext uri="{BB962C8B-B14F-4D97-AF65-F5344CB8AC3E}">
+        <p14:creationId xmlns:p14="http://schemas.microsoft.com/office/powerpoint/2010/main" val="4066101104"/>
+      </p:ext>
+    </p:extLst>
+  </p:cSld>
+  <p:clrMapOvr>
+    <a:masterClrMapping/>
+  </p:clrMapOvr>
+</p:sld>
+</file>
+
+<file path=ppt/slides/slide12.xml><?xml version="1.0" encoding="utf-8"?>
+<p:sld xmlns:a="http://schemas.openxmlformats.org/drawingml/2006/main" xmlns:r="http://schemas.openxmlformats.org/officeDocument/2006/relationships" xmlns:p="http://schemas.openxmlformats.org/presentationml/2006/main">
+  <p:cSld>
+    <p:spTree>
+      <p:nvGrpSpPr>
+        <p:cNvPr id="1" name=""/>
+        <p:cNvGrpSpPr/>
+        <p:nvPr/>
+      </p:nvGrpSpPr>
+      <p:grpSpPr>
+        <a:xfrm>
+          <a:off x="0" y="0"/>
+          <a:ext cx="0" cy="0"/>
+          <a:chOff x="0" y="0"/>
+          <a:chExt cx="0" cy="0"/>
+        </a:xfrm>
+      </p:grpSpPr>
+      <p:sp>
+        <p:nvSpPr>
+          <p:cNvPr id="5" name="Slide Number Placeholder 4">
+            <a:extLst>
+              <a:ext uri="{FF2B5EF4-FFF2-40B4-BE49-F238E27FC236}">
+                <a16:creationId xmlns:a16="http://schemas.microsoft.com/office/drawing/2014/main" id="{AAE0A73A-0DF3-3A44-813D-3A4A08C1D621}"/>
+              </a:ext>
+            </a:extLst>
+          </p:cNvPr>
+          <p:cNvSpPr>
+            <a:spLocks noGrp="1"/>
+          </p:cNvSpPr>
+          <p:nvPr>
+            <p:ph type="sldNum" sz="quarter" idx="12"/>
+          </p:nvPr>
+        </p:nvSpPr>
+        <p:spPr/>
+        <p:txBody>
+          <a:bodyPr/>
+          <a:lstStyle/>
+          <a:p>
+            <a:fld id="{018BF65D-6ED2-4CD5-9A43-7F793B06593C}" type="slidenum">
+              <a:rPr lang="ru-RU" smtClean="0"/>
+              <a:t>12</a:t>
             </a:fld>
             <a:endParaRPr lang="ru-RU"/>
           </a:p>
@@ -10325,9 +10618,129 @@
         </p:blipFill>
         <p:spPr>
           <a:xfrm>
-            <a:off x="274545" y="2108859"/>
+            <a:off x="274544" y="2875648"/>
             <a:ext cx="11642910" cy="3377542"/>
           </a:xfrm>
+        </p:spPr>
+      </p:pic>
+      <p:sp>
+        <p:nvSpPr>
+          <p:cNvPr id="2" name="TextBox 1">
+            <a:extLst>
+              <a:ext uri="{FF2B5EF4-FFF2-40B4-BE49-F238E27FC236}">
+                <a16:creationId xmlns:a16="http://schemas.microsoft.com/office/drawing/2014/main" id="{5BB04CD7-5B1F-4BE0-8AAC-F70055042F14}"/>
+              </a:ext>
+            </a:extLst>
+          </p:cNvPr>
+          <p:cNvSpPr txBox="1"/>
+          <p:nvPr/>
+        </p:nvSpPr>
+        <p:spPr>
+          <a:xfrm>
+            <a:off x="274544" y="1244432"/>
+            <a:ext cx="9373309" cy="1631216"/>
+          </a:xfrm>
+          <a:prstGeom prst="rect">
+            <a:avLst/>
+          </a:prstGeom>
+          <a:noFill/>
+        </p:spPr>
+        <p:txBody>
+          <a:bodyPr wrap="square" rtlCol="0">
+            <a:spAutoFit/>
+          </a:bodyPr>
+          <a:lstStyle/>
+          <a:p>
+            <a:r>
+              <a:rPr lang="en-US" sz="2000" dirty="0">
+                <a:latin typeface="Helvetica Neue" panose="02000503000000020004"/>
+              </a:rPr>
+              <a:t>Flexible Programming Language Benchmarking (FPLB)</a:t>
+            </a:r>
+            <a:endParaRPr lang="ru-RU" sz="2000" dirty="0">
+              <a:latin typeface="Helvetica Neue" panose="02000503000000020004"/>
+            </a:endParaRPr>
+          </a:p>
+          <a:p>
+            <a:r>
+              <a:rPr lang="ru-RU" sz="2000" dirty="0">
+                <a:latin typeface="Helvetica Neue" panose="02000503000000020004"/>
+              </a:rPr>
+              <a:t>Гибкий Бенчмаркинг Языков Программирования </a:t>
+            </a:r>
+            <a:endParaRPr lang="en-US" sz="2000" dirty="0">
+              <a:latin typeface="Helvetica Neue" panose="02000503000000020004"/>
+            </a:endParaRPr>
+          </a:p>
+          <a:p>
+            <a:endParaRPr lang="en-US" sz="2000" dirty="0">
+              <a:latin typeface="Helvetica Neue" panose="02000503000000020004"/>
+            </a:endParaRPr>
+          </a:p>
+          <a:p>
+            <a:endParaRPr lang="en-US" sz="2000" dirty="0">
+              <a:latin typeface="Helvetica Neue" panose="02000503000000020004"/>
+            </a:endParaRPr>
+          </a:p>
+          <a:p>
+            <a:r>
+              <a:rPr lang="ru-RU" sz="2000" dirty="0">
+                <a:latin typeface="Helvetica Neue" panose="02000503000000020004"/>
+              </a:rPr>
+              <a:t>Диаграмма классов ПО для исследования быстродействия ЯП «</a:t>
+            </a:r>
+            <a:r>
+              <a:rPr lang="en-US" sz="2000" dirty="0">
+                <a:latin typeface="Helvetica Neue" panose="02000503000000020004"/>
+              </a:rPr>
+              <a:t>FPLB</a:t>
+            </a:r>
+            <a:r>
+              <a:rPr lang="ru-RU" sz="2000" dirty="0">
+                <a:latin typeface="Helvetica Neue" panose="02000503000000020004"/>
+              </a:rPr>
+              <a:t>»</a:t>
+            </a:r>
+            <a:endParaRPr lang="en-US" sz="2000" dirty="0">
+              <a:latin typeface="Helvetica Neue" panose="02000503000000020004"/>
+            </a:endParaRPr>
+          </a:p>
+        </p:txBody>
+      </p:sp>
+      <p:pic>
+        <p:nvPicPr>
+          <p:cNvPr id="6" name="Picture 5">
+            <a:extLst>
+              <a:ext uri="{FF2B5EF4-FFF2-40B4-BE49-F238E27FC236}">
+                <a16:creationId xmlns:a16="http://schemas.microsoft.com/office/drawing/2014/main" id="{1D75DE12-E870-4412-BE25-1C1813A949E8}"/>
+              </a:ext>
+            </a:extLst>
+          </p:cNvPr>
+          <p:cNvPicPr>
+            <a:picLocks noChangeAspect="1"/>
+          </p:cNvPicPr>
+          <p:nvPr/>
+        </p:nvPicPr>
+        <p:blipFill>
+          <a:blip r:embed="rId6">
+            <a:extLst>
+              <a:ext uri="{28A0092B-C50C-407E-A947-70E740481C1C}">
+                <a14:useLocalDpi xmlns:a14="http://schemas.microsoft.com/office/drawing/2010/main" val="0"/>
+              </a:ext>
+            </a:extLst>
+          </a:blip>
+          <a:stretch>
+            <a:fillRect/>
+          </a:stretch>
+        </p:blipFill>
+        <p:spPr>
+          <a:xfrm>
+            <a:off x="9694022" y="1059393"/>
+            <a:ext cx="1861457" cy="1861457"/>
+          </a:xfrm>
+          <a:prstGeom prst="rect">
+            <a:avLst/>
+          </a:prstGeom>
         </p:spPr>
       </p:pic>
     </p:spTree>
@@ -10452,7 +10865,7 @@
               <a:rPr lang="ru-RU" sz="4000" b="1" dirty="0">
                 <a:latin typeface="+mn-lt"/>
               </a:rPr>
-              <a:t>Блок схема алгоритма ПО</a:t>
+              <a:t>Блок-схема алгоритма ПО</a:t>
             </a:r>
           </a:p>
         </p:txBody>
@@ -10560,11 +10973,73 @@
         </p:blipFill>
         <p:spPr>
           <a:xfrm>
-            <a:off x="2142930" y="1066267"/>
+            <a:off x="195649" y="1173579"/>
             <a:ext cx="7906139" cy="5615735"/>
           </a:xfrm>
         </p:spPr>
       </p:pic>
+      <p:sp>
+        <p:nvSpPr>
+          <p:cNvPr id="2" name="TextBox 1">
+            <a:extLst>
+              <a:ext uri="{FF2B5EF4-FFF2-40B4-BE49-F238E27FC236}">
+                <a16:creationId xmlns:a16="http://schemas.microsoft.com/office/drawing/2014/main" id="{0E29ABD6-DB4B-482A-A5EF-714E3A90A9ED}"/>
+              </a:ext>
+            </a:extLst>
+          </p:cNvPr>
+          <p:cNvSpPr txBox="1"/>
+          <p:nvPr/>
+        </p:nvSpPr>
+        <p:spPr>
+          <a:xfrm>
+            <a:off x="8391331" y="3300415"/>
+            <a:ext cx="3452326" cy="1200329"/>
+          </a:xfrm>
+          <a:prstGeom prst="rect">
+            <a:avLst/>
+          </a:prstGeom>
+          <a:noFill/>
+        </p:spPr>
+        <p:txBody>
+          <a:bodyPr wrap="square" rtlCol="0">
+            <a:spAutoFit/>
+          </a:bodyPr>
+          <a:lstStyle/>
+          <a:p>
+            <a:pPr algn="just"/>
+            <a:r>
+              <a:rPr lang="ru-RU" dirty="0">
+                <a:latin typeface="Helvetica Neue" panose="02000503000000020004"/>
+              </a:rPr>
+              <a:t>Блок-схема алгоритма работы ПО </a:t>
+            </a:r>
+            <a:r>
+              <a:rPr lang="ru-RU" sz="1800" dirty="0">
+                <a:latin typeface="Helvetica Neue" panose="02000503000000020004"/>
+              </a:rPr>
+              <a:t>для исследован</a:t>
+            </a:r>
+            <a:r>
+              <a:rPr lang="ru-RU" dirty="0">
+                <a:latin typeface="Helvetica Neue" panose="02000503000000020004"/>
+              </a:rPr>
+              <a:t>ия быстродействия языков программирования «</a:t>
+            </a:r>
+            <a:r>
+              <a:rPr lang="en-US" dirty="0">
+                <a:latin typeface="Helvetica Neue" panose="02000503000000020004"/>
+              </a:rPr>
+              <a:t>FPLB</a:t>
+            </a:r>
+            <a:r>
+              <a:rPr lang="ru-RU" dirty="0">
+                <a:latin typeface="Helvetica Neue" panose="02000503000000020004"/>
+              </a:rPr>
+              <a:t>»</a:t>
+            </a:r>
+          </a:p>
+        </p:txBody>
+      </p:sp>
     </p:spTree>
     <p:extLst>
       <p:ext uri="{BB962C8B-B14F-4D97-AF65-F5344CB8AC3E}">

</xml_diff>

<commit_message>
Added algo and results to presentation
</commit_message>
<xml_diff>
--- a/docs/presentation/presentation.pptx
+++ b/docs/presentation/presentation.pptx
@@ -5,10 +5,10 @@
     <p:sldMasterId id="2147483648" r:id="rId1"/>
   </p:sldMasterIdLst>
   <p:notesMasterIdLst>
-    <p:notesMasterId r:id="rId14"/>
+    <p:notesMasterId r:id="rId16"/>
   </p:notesMasterIdLst>
   <p:handoutMasterIdLst>
-    <p:handoutMasterId r:id="rId15"/>
+    <p:handoutMasterId r:id="rId17"/>
   </p:handoutMasterIdLst>
   <p:sldIdLst>
     <p:sldId id="256" r:id="rId2"/>
@@ -21,8 +21,10 @@
     <p:sldId id="298" r:id="rId9"/>
     <p:sldId id="299" r:id="rId10"/>
     <p:sldId id="300" r:id="rId11"/>
-    <p:sldId id="267" r:id="rId12"/>
-    <p:sldId id="268" r:id="rId13"/>
+    <p:sldId id="302" r:id="rId12"/>
+    <p:sldId id="303" r:id="rId13"/>
+    <p:sldId id="267" r:id="rId14"/>
+    <p:sldId id="268" r:id="rId15"/>
   </p:sldIdLst>
   <p:sldSz cx="12192000" cy="6858000"/>
   <p:notesSz cx="6858000" cy="9144000"/>
@@ -1025,7 +1027,15 @@
           <a:bodyPr/>
           <a:lstStyle/>
           <a:p>
-            <a:endParaRPr lang="en-RU" dirty="0"/>
+            <a:endParaRPr lang="en-RU" sz="1200" kern="1200" dirty="0">
+              <a:solidFill>
+                <a:schemeClr val="tx1"/>
+              </a:solidFill>
+              <a:effectLst/>
+              <a:latin typeface="+mn-lt"/>
+              <a:ea typeface="+mn-ea"/>
+              <a:cs typeface="+mn-cs"/>
+            </a:endParaRPr>
           </a:p>
         </p:txBody>
       </p:sp>
@@ -1055,7 +1065,7 @@
     </p:spTree>
     <p:extLst>
       <p:ext uri="{BB962C8B-B14F-4D97-AF65-F5344CB8AC3E}">
-        <p14:creationId xmlns:p14="http://schemas.microsoft.com/office/powerpoint/2010/main" val="2480852342"/>
+        <p14:creationId xmlns:p14="http://schemas.microsoft.com/office/powerpoint/2010/main" val="3884398107"/>
       </p:ext>
     </p:extLst>
   </p:cSld>
@@ -1139,6 +1149,182 @@
             <a:fld id="{80EA287C-F450-484E-9FD5-FC6D729DAEC8}" type="slidenum">
               <a:rPr lang="en-RU" smtClean="0"/>
               <a:t>12</a:t>
+            </a:fld>
+            <a:endParaRPr lang="en-RU"/>
+          </a:p>
+        </p:txBody>
+      </p:sp>
+    </p:spTree>
+    <p:extLst>
+      <p:ext uri="{BB962C8B-B14F-4D97-AF65-F5344CB8AC3E}">
+        <p14:creationId xmlns:p14="http://schemas.microsoft.com/office/powerpoint/2010/main" val="3042298071"/>
+      </p:ext>
+    </p:extLst>
+  </p:cSld>
+  <p:clrMapOvr>
+    <a:masterClrMapping/>
+  </p:clrMapOvr>
+</p:notes>
+</file>
+
+<file path=ppt/notesSlides/notesSlide13.xml><?xml version="1.0" encoding="utf-8"?>
+<p:notes xmlns:a="http://schemas.openxmlformats.org/drawingml/2006/main" xmlns:r="http://schemas.openxmlformats.org/officeDocument/2006/relationships" xmlns:p="http://schemas.openxmlformats.org/presentationml/2006/main">
+  <p:cSld>
+    <p:spTree>
+      <p:nvGrpSpPr>
+        <p:cNvPr id="1" name=""/>
+        <p:cNvGrpSpPr/>
+        <p:nvPr/>
+      </p:nvGrpSpPr>
+      <p:grpSpPr>
+        <a:xfrm>
+          <a:off x="0" y="0"/>
+          <a:ext cx="0" cy="0"/>
+          <a:chOff x="0" y="0"/>
+          <a:chExt cx="0" cy="0"/>
+        </a:xfrm>
+      </p:grpSpPr>
+      <p:sp>
+        <p:nvSpPr>
+          <p:cNvPr id="2" name="Slide Image Placeholder 1"/>
+          <p:cNvSpPr>
+            <a:spLocks noGrp="1" noRot="1" noChangeAspect="1"/>
+          </p:cNvSpPr>
+          <p:nvPr>
+            <p:ph type="sldImg"/>
+          </p:nvPr>
+        </p:nvSpPr>
+        <p:spPr/>
+      </p:sp>
+      <p:sp>
+        <p:nvSpPr>
+          <p:cNvPr id="3" name="Notes Placeholder 2"/>
+          <p:cNvSpPr>
+            <a:spLocks noGrp="1"/>
+          </p:cNvSpPr>
+          <p:nvPr>
+            <p:ph type="body" idx="1"/>
+          </p:nvPr>
+        </p:nvSpPr>
+        <p:spPr/>
+        <p:txBody>
+          <a:bodyPr/>
+          <a:lstStyle/>
+          <a:p>
+            <a:endParaRPr lang="en-RU" dirty="0"/>
+          </a:p>
+        </p:txBody>
+      </p:sp>
+      <p:sp>
+        <p:nvSpPr>
+          <p:cNvPr id="4" name="Slide Number Placeholder 3"/>
+          <p:cNvSpPr>
+            <a:spLocks noGrp="1"/>
+          </p:cNvSpPr>
+          <p:nvPr>
+            <p:ph type="sldNum" sz="quarter" idx="5"/>
+          </p:nvPr>
+        </p:nvSpPr>
+        <p:spPr/>
+        <p:txBody>
+          <a:bodyPr/>
+          <a:lstStyle/>
+          <a:p>
+            <a:fld id="{80EA287C-F450-484E-9FD5-FC6D729DAEC8}" type="slidenum">
+              <a:rPr lang="en-RU" smtClean="0"/>
+              <a:t>13</a:t>
+            </a:fld>
+            <a:endParaRPr lang="en-RU"/>
+          </a:p>
+        </p:txBody>
+      </p:sp>
+    </p:spTree>
+    <p:extLst>
+      <p:ext uri="{BB962C8B-B14F-4D97-AF65-F5344CB8AC3E}">
+        <p14:creationId xmlns:p14="http://schemas.microsoft.com/office/powerpoint/2010/main" val="2480852342"/>
+      </p:ext>
+    </p:extLst>
+  </p:cSld>
+  <p:clrMapOvr>
+    <a:masterClrMapping/>
+  </p:clrMapOvr>
+</p:notes>
+</file>
+
+<file path=ppt/notesSlides/notesSlide14.xml><?xml version="1.0" encoding="utf-8"?>
+<p:notes xmlns:a="http://schemas.openxmlformats.org/drawingml/2006/main" xmlns:r="http://schemas.openxmlformats.org/officeDocument/2006/relationships" xmlns:p="http://schemas.openxmlformats.org/presentationml/2006/main">
+  <p:cSld>
+    <p:spTree>
+      <p:nvGrpSpPr>
+        <p:cNvPr id="1" name=""/>
+        <p:cNvGrpSpPr/>
+        <p:nvPr/>
+      </p:nvGrpSpPr>
+      <p:grpSpPr>
+        <a:xfrm>
+          <a:off x="0" y="0"/>
+          <a:ext cx="0" cy="0"/>
+          <a:chOff x="0" y="0"/>
+          <a:chExt cx="0" cy="0"/>
+        </a:xfrm>
+      </p:grpSpPr>
+      <p:sp>
+        <p:nvSpPr>
+          <p:cNvPr id="2" name="Slide Image Placeholder 1"/>
+          <p:cNvSpPr>
+            <a:spLocks noGrp="1" noRot="1" noChangeAspect="1"/>
+          </p:cNvSpPr>
+          <p:nvPr>
+            <p:ph type="sldImg"/>
+          </p:nvPr>
+        </p:nvSpPr>
+        <p:spPr/>
+      </p:sp>
+      <p:sp>
+        <p:nvSpPr>
+          <p:cNvPr id="3" name="Notes Placeholder 2"/>
+          <p:cNvSpPr>
+            <a:spLocks noGrp="1"/>
+          </p:cNvSpPr>
+          <p:nvPr>
+            <p:ph type="body" idx="1"/>
+          </p:nvPr>
+        </p:nvSpPr>
+        <p:spPr/>
+        <p:txBody>
+          <a:bodyPr/>
+          <a:lstStyle/>
+          <a:p>
+            <a:endParaRPr lang="en-RU" sz="1200" kern="1200" dirty="0">
+              <a:solidFill>
+                <a:schemeClr val="tx1"/>
+              </a:solidFill>
+              <a:effectLst/>
+              <a:latin typeface="+mn-lt"/>
+              <a:ea typeface="+mn-ea"/>
+              <a:cs typeface="+mn-cs"/>
+            </a:endParaRPr>
+          </a:p>
+        </p:txBody>
+      </p:sp>
+      <p:sp>
+        <p:nvSpPr>
+          <p:cNvPr id="4" name="Slide Number Placeholder 3"/>
+          <p:cNvSpPr>
+            <a:spLocks noGrp="1"/>
+          </p:cNvSpPr>
+          <p:nvPr>
+            <p:ph type="sldNum" sz="quarter" idx="5"/>
+          </p:nvPr>
+        </p:nvSpPr>
+        <p:spPr/>
+        <p:txBody>
+          <a:bodyPr/>
+          <a:lstStyle/>
+          <a:p>
+            <a:fld id="{80EA287C-F450-484E-9FD5-FC6D729DAEC8}" type="slidenum">
+              <a:rPr lang="en-RU" smtClean="0"/>
+              <a:t>14</a:t>
             </a:fld>
             <a:endParaRPr lang="en-RU"/>
           </a:p>
@@ -5844,6 +6030,79 @@
           <a:effectLst/>
         </p:spPr>
       </p:pic>
+      <p:pic>
+        <p:nvPicPr>
+          <p:cNvPr id="3" name="Picture 2">
+            <a:extLst>
+              <a:ext uri="{FF2B5EF4-FFF2-40B4-BE49-F238E27FC236}">
+                <a16:creationId xmlns:a16="http://schemas.microsoft.com/office/drawing/2014/main" id="{21618612-E936-4B6A-B4AA-3152A2839B3F}"/>
+              </a:ext>
+            </a:extLst>
+          </p:cNvPr>
+          <p:cNvPicPr>
+            <a:picLocks noChangeAspect="1"/>
+          </p:cNvPicPr>
+          <p:nvPr/>
+        </p:nvPicPr>
+        <p:blipFill>
+          <a:blip r:embed="rId5">
+            <a:extLst>
+              <a:ext uri="{28A0092B-C50C-407E-A947-70E740481C1C}">
+                <a14:useLocalDpi xmlns:a14="http://schemas.microsoft.com/office/drawing/2010/main" val="0"/>
+              </a:ext>
+            </a:extLst>
+          </a:blip>
+          <a:stretch>
+            <a:fillRect/>
+          </a:stretch>
+        </p:blipFill>
+        <p:spPr>
+          <a:xfrm>
+            <a:off x="83617" y="1009888"/>
+            <a:ext cx="8389623" cy="5702073"/>
+          </a:xfrm>
+          <a:prstGeom prst="rect">
+            <a:avLst/>
+          </a:prstGeom>
+        </p:spPr>
+      </p:pic>
+      <p:sp>
+        <p:nvSpPr>
+          <p:cNvPr id="6" name="TextBox 5">
+            <a:extLst>
+              <a:ext uri="{FF2B5EF4-FFF2-40B4-BE49-F238E27FC236}">
+                <a16:creationId xmlns:a16="http://schemas.microsoft.com/office/drawing/2014/main" id="{11BF13A0-A3DE-478A-932F-41E0B33D3784}"/>
+              </a:ext>
+            </a:extLst>
+          </p:cNvPr>
+          <p:cNvSpPr txBox="1"/>
+          <p:nvPr/>
+        </p:nvSpPr>
+        <p:spPr>
+          <a:xfrm>
+            <a:off x="8559282" y="2466475"/>
+            <a:ext cx="3437069" cy="2585323"/>
+          </a:xfrm>
+          <a:prstGeom prst="rect">
+            <a:avLst/>
+          </a:prstGeom>
+          <a:noFill/>
+        </p:spPr>
+        <p:txBody>
+          <a:bodyPr wrap="square" rtlCol="0">
+            <a:spAutoFit/>
+          </a:bodyPr>
+          <a:lstStyle/>
+          <a:p>
+            <a:r>
+              <a:rPr lang="ru-RU" dirty="0">
+                <a:latin typeface="Helvetica Neue" panose="02000503000000020004"/>
+              </a:rPr>
+              <a:t>Пример структуры четырехуровневого иерархического дескриптора конфигурации для проведения исследования быстродействия выполнения заданных алгоритмов различными языками программирования</a:t>
+            </a:r>
+          </a:p>
+        </p:txBody>
+      </p:sp>
     </p:spTree>
     <p:extLst>
       <p:ext uri="{BB962C8B-B14F-4D97-AF65-F5344CB8AC3E}">
@@ -5879,7 +6138,7 @@
           <p:cNvPr id="5" name="Slide Number Placeholder 4">
             <a:extLst>
               <a:ext uri="{FF2B5EF4-FFF2-40B4-BE49-F238E27FC236}">
-                <a16:creationId xmlns:a16="http://schemas.microsoft.com/office/drawing/2014/main" id="{FA23F4B6-34F6-5F49-8575-0B830127F0BA}"/>
+                <a16:creationId xmlns:a16="http://schemas.microsoft.com/office/drawing/2014/main" id="{3B502563-780D-9A4C-8688-21BD4E6EF31A}"/>
               </a:ext>
             </a:extLst>
           </p:cNvPr>
@@ -5899,7 +6158,7 @@
               <a:rPr lang="ru-RU" smtClean="0"/>
               <a:t>11</a:t>
             </a:fld>
-            <a:endParaRPr lang="ru-RU"/>
+            <a:endParaRPr lang="ru-RU" dirty="0"/>
           </a:p>
         </p:txBody>
       </p:sp>
@@ -5908,7 +6167,7 @@
           <p:cNvPr id="7" name="Заголовок 1">
             <a:extLst>
               <a:ext uri="{FF2B5EF4-FFF2-40B4-BE49-F238E27FC236}">
-                <a16:creationId xmlns:a16="http://schemas.microsoft.com/office/drawing/2014/main" id="{C97D02F3-B3CF-1A40-992B-3BCE54AEC322}"/>
+                <a16:creationId xmlns:a16="http://schemas.microsoft.com/office/drawing/2014/main" id="{5244247D-458B-804E-8660-B8C8BACFDC3F}"/>
               </a:ext>
             </a:extLst>
           </p:cNvPr>
@@ -5963,10 +6222,10 @@
               <a:t>	</a:t>
             </a:r>
             <a:r>
-              <a:rPr lang="ru-RU" b="1" dirty="0">
+              <a:rPr lang="ru-RU" sz="4000" b="1" dirty="0">
                 <a:latin typeface="+mn-lt"/>
               </a:rPr>
-              <a:t>Заключение</a:t>
+              <a:t>Обзор исследуемых алгоритмов</a:t>
             </a:r>
           </a:p>
         </p:txBody>
@@ -5976,7 +6235,7 @@
           <p:cNvPr id="8" name="Picture 7">
             <a:extLst>
               <a:ext uri="{FF2B5EF4-FFF2-40B4-BE49-F238E27FC236}">
-                <a16:creationId xmlns:a16="http://schemas.microsoft.com/office/drawing/2014/main" id="{E865F144-5406-EF47-B91B-14B125A33E9F}"/>
+                <a16:creationId xmlns:a16="http://schemas.microsoft.com/office/drawing/2014/main" id="{E9C1B6FE-0157-D842-B40B-5230337F328B}"/>
               </a:ext>
             </a:extLst>
           </p:cNvPr>
@@ -6012,7 +6271,7 @@
           <p:cNvPr id="9" name="Picture 8">
             <a:extLst>
               <a:ext uri="{FF2B5EF4-FFF2-40B4-BE49-F238E27FC236}">
-                <a16:creationId xmlns:a16="http://schemas.microsoft.com/office/drawing/2014/main" id="{086CDF8B-5A30-8C4F-B34E-4275A0D98BC9}"/>
+                <a16:creationId xmlns:a16="http://schemas.microsoft.com/office/drawing/2014/main" id="{C108A182-E882-F649-9105-60A469C17A4C}"/>
               </a:ext>
             </a:extLst>
           </p:cNvPr>
@@ -6046,33 +6305,308 @@
       </p:pic>
       <p:sp>
         <p:nvSpPr>
-          <p:cNvPr id="4" name="Content Placeholder 3">
-            <a:extLst>
-              <a:ext uri="{FF2B5EF4-FFF2-40B4-BE49-F238E27FC236}">
-                <a16:creationId xmlns:a16="http://schemas.microsoft.com/office/drawing/2014/main" id="{B5864989-CF3D-4AA0-88E2-0C0B8B6D17BC}"/>
-              </a:ext>
-            </a:extLst>
-          </p:cNvPr>
-          <p:cNvSpPr>
-            <a:spLocks noGrp="1"/>
-          </p:cNvSpPr>
-          <p:nvPr>
-            <p:ph idx="1"/>
-          </p:nvPr>
-        </p:nvSpPr>
-        <p:spPr/>
-        <p:txBody>
-          <a:bodyPr/>
+          <p:cNvPr id="6" name="TextBox 5">
+            <a:extLst>
+              <a:ext uri="{FF2B5EF4-FFF2-40B4-BE49-F238E27FC236}">
+                <a16:creationId xmlns:a16="http://schemas.microsoft.com/office/drawing/2014/main" id="{11BF13A0-A3DE-478A-932F-41E0B33D3784}"/>
+              </a:ext>
+            </a:extLst>
+          </p:cNvPr>
+          <p:cNvSpPr txBox="1"/>
+          <p:nvPr/>
+        </p:nvSpPr>
+        <p:spPr>
+          <a:xfrm>
+            <a:off x="9343053" y="1359243"/>
+            <a:ext cx="2653298" cy="4247317"/>
+          </a:xfrm>
+          <a:prstGeom prst="rect">
+            <a:avLst/>
+          </a:prstGeom>
+          <a:noFill/>
+        </p:spPr>
+        <p:txBody>
+          <a:bodyPr wrap="square" rtlCol="0">
+            <a:spAutoFit/>
+          </a:bodyPr>
           <a:lstStyle/>
           <a:p>
-            <a:endParaRPr lang="ru-RU"/>
+            <a:r>
+              <a:rPr lang="ru-RU" dirty="0">
+                <a:latin typeface="Helvetica Neue" panose="02000503000000020004"/>
+              </a:rPr>
+              <a:t>Блок-схемы алгоритмов, используемых для проведения исследования быстродействия языков программирования</a:t>
+            </a:r>
+          </a:p>
+          <a:p>
+            <a:endParaRPr lang="ru-RU" dirty="0">
+              <a:latin typeface="Helvetica Neue" panose="02000503000000020004"/>
+            </a:endParaRPr>
+          </a:p>
+          <a:p>
+            <a:pPr marL="342900" indent="-342900">
+              <a:buFont typeface="+mj-lt"/>
+              <a:buAutoNum type="arabicPeriod"/>
+            </a:pPr>
+            <a:r>
+              <a:rPr lang="ru-RU" dirty="0">
+                <a:latin typeface="Helvetica Neue" panose="02000503000000020004"/>
+              </a:rPr>
+              <a:t>Алгоритм умножения матриц</a:t>
+            </a:r>
+          </a:p>
+          <a:p>
+            <a:pPr marL="342900" indent="-342900">
+              <a:buFont typeface="+mj-lt"/>
+              <a:buAutoNum type="arabicPeriod"/>
+            </a:pPr>
+            <a:r>
+              <a:rPr lang="ru-RU" dirty="0">
+                <a:latin typeface="Helvetica Neue" panose="02000503000000020004"/>
+              </a:rPr>
+              <a:t>Алгоритм «Быстрая сортировка»</a:t>
+            </a:r>
+          </a:p>
+          <a:p>
+            <a:pPr marL="342900" indent="-342900">
+              <a:buFont typeface="+mj-lt"/>
+              <a:buAutoNum type="arabicPeriod"/>
+            </a:pPr>
+            <a:r>
+              <a:rPr lang="ru-RU" dirty="0">
+                <a:latin typeface="Helvetica Neue" panose="02000503000000020004"/>
+              </a:rPr>
+              <a:t>Алгоритм поиска простых чисел</a:t>
+            </a:r>
+          </a:p>
+        </p:txBody>
+      </p:sp>
+      <p:pic>
+        <p:nvPicPr>
+          <p:cNvPr id="11" name="Picture 10">
+            <a:extLst>
+              <a:ext uri="{FF2B5EF4-FFF2-40B4-BE49-F238E27FC236}">
+                <a16:creationId xmlns:a16="http://schemas.microsoft.com/office/drawing/2014/main" id="{C488478D-C1A8-47F9-9155-B71D41D3AB04}"/>
+              </a:ext>
+            </a:extLst>
+          </p:cNvPr>
+          <p:cNvPicPr>
+            <a:picLocks noChangeAspect="1"/>
+          </p:cNvPicPr>
+          <p:nvPr/>
+        </p:nvPicPr>
+        <p:blipFill>
+          <a:blip r:embed="rId5">
+            <a:extLst>
+              <a:ext uri="{28A0092B-C50C-407E-A947-70E740481C1C}">
+                <a14:useLocalDpi xmlns:a14="http://schemas.microsoft.com/office/drawing/2010/main" val="0"/>
+              </a:ext>
+            </a:extLst>
+          </a:blip>
+          <a:stretch>
+            <a:fillRect/>
+          </a:stretch>
+        </p:blipFill>
+        <p:spPr>
+          <a:xfrm>
+            <a:off x="4030834" y="1277375"/>
+            <a:ext cx="2065165" cy="4989613"/>
+          </a:xfrm>
+          <a:prstGeom prst="rect">
+            <a:avLst/>
+          </a:prstGeom>
+        </p:spPr>
+      </p:pic>
+      <p:pic>
+        <p:nvPicPr>
+          <p:cNvPr id="19" name="Picture 18">
+            <a:extLst>
+              <a:ext uri="{FF2B5EF4-FFF2-40B4-BE49-F238E27FC236}">
+                <a16:creationId xmlns:a16="http://schemas.microsoft.com/office/drawing/2014/main" id="{30D60359-2333-4CC5-A139-5F08B528ACB1}"/>
+              </a:ext>
+            </a:extLst>
+          </p:cNvPr>
+          <p:cNvPicPr>
+            <a:picLocks noChangeAspect="1"/>
+          </p:cNvPicPr>
+          <p:nvPr/>
+        </p:nvPicPr>
+        <p:blipFill>
+          <a:blip r:embed="rId6">
+            <a:extLst>
+              <a:ext uri="{28A0092B-C50C-407E-A947-70E740481C1C}">
+                <a14:useLocalDpi xmlns:a14="http://schemas.microsoft.com/office/drawing/2010/main" val="0"/>
+              </a:ext>
+            </a:extLst>
+          </a:blip>
+          <a:stretch>
+            <a:fillRect/>
+          </a:stretch>
+        </p:blipFill>
+        <p:spPr>
+          <a:xfrm>
+            <a:off x="6352817" y="1096075"/>
+            <a:ext cx="2733418" cy="5170913"/>
+          </a:xfrm>
+          <a:prstGeom prst="rect">
+            <a:avLst/>
+          </a:prstGeom>
+        </p:spPr>
+      </p:pic>
+      <p:pic>
+        <p:nvPicPr>
+          <p:cNvPr id="21" name="Picture 20">
+            <a:extLst>
+              <a:ext uri="{FF2B5EF4-FFF2-40B4-BE49-F238E27FC236}">
+                <a16:creationId xmlns:a16="http://schemas.microsoft.com/office/drawing/2014/main" id="{3F5F0E88-B832-494F-86D9-081CB561EFCF}"/>
+              </a:ext>
+            </a:extLst>
+          </p:cNvPr>
+          <p:cNvPicPr>
+            <a:picLocks noChangeAspect="1"/>
+          </p:cNvPicPr>
+          <p:nvPr/>
+        </p:nvPicPr>
+        <p:blipFill>
+          <a:blip r:embed="rId7">
+            <a:extLst>
+              <a:ext uri="{28A0092B-C50C-407E-A947-70E740481C1C}">
+                <a14:useLocalDpi xmlns:a14="http://schemas.microsoft.com/office/drawing/2010/main" val="0"/>
+              </a:ext>
+            </a:extLst>
+          </a:blip>
+          <a:stretch>
+            <a:fillRect/>
+          </a:stretch>
+        </p:blipFill>
+        <p:spPr>
+          <a:xfrm>
+            <a:off x="83617" y="1736704"/>
+            <a:ext cx="3767059" cy="3767866"/>
+          </a:xfrm>
+          <a:prstGeom prst="rect">
+            <a:avLst/>
+          </a:prstGeom>
+        </p:spPr>
+      </p:pic>
+      <p:sp>
+        <p:nvSpPr>
+          <p:cNvPr id="22" name="TextBox 21">
+            <a:extLst>
+              <a:ext uri="{FF2B5EF4-FFF2-40B4-BE49-F238E27FC236}">
+                <a16:creationId xmlns:a16="http://schemas.microsoft.com/office/drawing/2014/main" id="{B5EF78BA-560B-4221-9B05-F6F8E5537E33}"/>
+              </a:ext>
+            </a:extLst>
+          </p:cNvPr>
+          <p:cNvSpPr txBox="1"/>
+          <p:nvPr/>
+        </p:nvSpPr>
+        <p:spPr>
+          <a:xfrm>
+            <a:off x="1721440" y="6266987"/>
+            <a:ext cx="491412" cy="584775"/>
+          </a:xfrm>
+          <a:prstGeom prst="rect">
+            <a:avLst/>
+          </a:prstGeom>
+          <a:noFill/>
+        </p:spPr>
+        <p:txBody>
+          <a:bodyPr wrap="square" rtlCol="0">
+            <a:spAutoFit/>
+          </a:bodyPr>
+          <a:lstStyle/>
+          <a:p>
+            <a:r>
+              <a:rPr lang="en-US" sz="3200" dirty="0">
+                <a:latin typeface="Helvetica Neue" panose="02000503000000020004"/>
+              </a:rPr>
+              <a:t>1</a:t>
+            </a:r>
+            <a:endParaRPr lang="ru-RU" sz="3200" dirty="0"/>
+          </a:p>
+        </p:txBody>
+      </p:sp>
+      <p:sp>
+        <p:nvSpPr>
+          <p:cNvPr id="25" name="TextBox 24">
+            <a:extLst>
+              <a:ext uri="{FF2B5EF4-FFF2-40B4-BE49-F238E27FC236}">
+                <a16:creationId xmlns:a16="http://schemas.microsoft.com/office/drawing/2014/main" id="{F6A38E51-1866-4929-BA10-8E75F2B99124}"/>
+              </a:ext>
+            </a:extLst>
+          </p:cNvPr>
+          <p:cNvSpPr txBox="1"/>
+          <p:nvPr/>
+        </p:nvSpPr>
+        <p:spPr>
+          <a:xfrm>
+            <a:off x="4816372" y="6273225"/>
+            <a:ext cx="491412" cy="584775"/>
+          </a:xfrm>
+          <a:prstGeom prst="rect">
+            <a:avLst/>
+          </a:prstGeom>
+          <a:noFill/>
+        </p:spPr>
+        <p:txBody>
+          <a:bodyPr wrap="square" rtlCol="0">
+            <a:spAutoFit/>
+          </a:bodyPr>
+          <a:lstStyle/>
+          <a:p>
+            <a:r>
+              <a:rPr lang="en-US" sz="3200" dirty="0">
+                <a:latin typeface="Helvetica Neue" panose="02000503000000020004"/>
+              </a:rPr>
+              <a:t>2</a:t>
+            </a:r>
+            <a:endParaRPr lang="ru-RU" sz="3200" dirty="0"/>
+          </a:p>
+        </p:txBody>
+      </p:sp>
+      <p:sp>
+        <p:nvSpPr>
+          <p:cNvPr id="26" name="TextBox 25">
+            <a:extLst>
+              <a:ext uri="{FF2B5EF4-FFF2-40B4-BE49-F238E27FC236}">
+                <a16:creationId xmlns:a16="http://schemas.microsoft.com/office/drawing/2014/main" id="{43B1A535-20FD-45E2-9D68-2D661964C1B8}"/>
+              </a:ext>
+            </a:extLst>
+          </p:cNvPr>
+          <p:cNvSpPr txBox="1"/>
+          <p:nvPr/>
+        </p:nvSpPr>
+        <p:spPr>
+          <a:xfrm>
+            <a:off x="8186066" y="6266988"/>
+            <a:ext cx="491412" cy="584775"/>
+          </a:xfrm>
+          <a:prstGeom prst="rect">
+            <a:avLst/>
+          </a:prstGeom>
+          <a:noFill/>
+        </p:spPr>
+        <p:txBody>
+          <a:bodyPr wrap="square" rtlCol="0">
+            <a:spAutoFit/>
+          </a:bodyPr>
+          <a:lstStyle/>
+          <a:p>
+            <a:r>
+              <a:rPr lang="en-US" sz="3200" dirty="0">
+                <a:latin typeface="Helvetica Neue" panose="02000503000000020004"/>
+              </a:rPr>
+              <a:t>3</a:t>
+            </a:r>
+            <a:endParaRPr lang="ru-RU" sz="3200" dirty="0"/>
           </a:p>
         </p:txBody>
       </p:sp>
     </p:spTree>
     <p:extLst>
       <p:ext uri="{BB962C8B-B14F-4D97-AF65-F5344CB8AC3E}">
-        <p14:creationId xmlns:p14="http://schemas.microsoft.com/office/powerpoint/2010/main" val="4066101104"/>
+        <p14:creationId xmlns:p14="http://schemas.microsoft.com/office/powerpoint/2010/main" val="4265460262"/>
       </p:ext>
     </p:extLst>
   </p:cSld>
@@ -6104,7 +6638,7 @@
           <p:cNvPr id="5" name="Slide Number Placeholder 4">
             <a:extLst>
               <a:ext uri="{FF2B5EF4-FFF2-40B4-BE49-F238E27FC236}">
-                <a16:creationId xmlns:a16="http://schemas.microsoft.com/office/drawing/2014/main" id="{AAE0A73A-0DF3-3A44-813D-3A4A08C1D621}"/>
+                <a16:creationId xmlns:a16="http://schemas.microsoft.com/office/drawing/2014/main" id="{3B502563-780D-9A4C-8688-21BD4E6EF31A}"/>
               </a:ext>
             </a:extLst>
           </p:cNvPr>
@@ -6123,6 +6657,656 @@
             <a:fld id="{018BF65D-6ED2-4CD5-9A43-7F793B06593C}" type="slidenum">
               <a:rPr lang="ru-RU" smtClean="0"/>
               <a:t>12</a:t>
+            </a:fld>
+            <a:endParaRPr lang="ru-RU" dirty="0"/>
+          </a:p>
+        </p:txBody>
+      </p:sp>
+      <p:sp>
+        <p:nvSpPr>
+          <p:cNvPr id="7" name="Заголовок 1">
+            <a:extLst>
+              <a:ext uri="{FF2B5EF4-FFF2-40B4-BE49-F238E27FC236}">
+                <a16:creationId xmlns:a16="http://schemas.microsoft.com/office/drawing/2014/main" id="{5244247D-458B-804E-8660-B8C8BACFDC3F}"/>
+              </a:ext>
+            </a:extLst>
+          </p:cNvPr>
+          <p:cNvSpPr txBox="1">
+            <a:spLocks/>
+          </p:cNvSpPr>
+          <p:nvPr/>
+        </p:nvSpPr>
+        <p:spPr>
+          <a:xfrm>
+            <a:off x="-1" y="-16805"/>
+            <a:ext cx="12192001" cy="941202"/>
+          </a:xfrm>
+          <a:prstGeom prst="rect">
+            <a:avLst/>
+          </a:prstGeom>
+          <a:solidFill>
+            <a:schemeClr val="accent3">
+              <a:lumMod val="20000"/>
+              <a:lumOff val="80000"/>
+            </a:schemeClr>
+          </a:solidFill>
+        </p:spPr>
+        <p:txBody>
+          <a:bodyPr vert="horz" lIns="91440" tIns="45720" rIns="91440" bIns="45720" rtlCol="0" anchor="ctr">
+            <a:normAutofit/>
+          </a:bodyPr>
+          <a:lstStyle>
+            <a:lvl1pPr algn="l" defTabSz="914400" rtl="0" eaLnBrk="1" latinLnBrk="0" hangingPunct="1">
+              <a:lnSpc>
+                <a:spcPct val="90000"/>
+              </a:lnSpc>
+              <a:spcBef>
+                <a:spcPct val="0"/>
+              </a:spcBef>
+              <a:buNone/>
+              <a:defRPr sz="4400" kern="1200">
+                <a:solidFill>
+                  <a:schemeClr val="tx1"/>
+                </a:solidFill>
+                <a:latin typeface="+mj-lt"/>
+                <a:ea typeface="+mj-ea"/>
+                <a:cs typeface="+mj-cs"/>
+              </a:defRPr>
+            </a:lvl1pPr>
+          </a:lstStyle>
+          <a:p>
+            <a:r>
+              <a:rPr lang="en-US" b="1" dirty="0">
+                <a:latin typeface="+mn-lt"/>
+              </a:rPr>
+              <a:t>	</a:t>
+            </a:r>
+            <a:r>
+              <a:rPr lang="ru-RU" sz="4000" b="1" dirty="0">
+                <a:latin typeface="+mn-lt"/>
+              </a:rPr>
+              <a:t>Результаты исследования быстродействия ЯП</a:t>
+            </a:r>
+          </a:p>
+        </p:txBody>
+      </p:sp>
+      <p:pic>
+        <p:nvPicPr>
+          <p:cNvPr id="8" name="Picture 7">
+            <a:extLst>
+              <a:ext uri="{FF2B5EF4-FFF2-40B4-BE49-F238E27FC236}">
+                <a16:creationId xmlns:a16="http://schemas.microsoft.com/office/drawing/2014/main" id="{E9C1B6FE-0157-D842-B40B-5230337F328B}"/>
+              </a:ext>
+            </a:extLst>
+          </p:cNvPr>
+          <p:cNvPicPr>
+            <a:picLocks noChangeAspect="1"/>
+          </p:cNvPicPr>
+          <p:nvPr/>
+        </p:nvPicPr>
+        <p:blipFill>
+          <a:blip r:embed="rId3">
+            <a:extLst>
+              <a:ext uri="{28A0092B-C50C-407E-A947-70E740481C1C}">
+                <a14:useLocalDpi xmlns:a14="http://schemas.microsoft.com/office/drawing/2010/main" val="0"/>
+              </a:ext>
+            </a:extLst>
+          </a:blip>
+          <a:stretch>
+            <a:fillRect/>
+          </a:stretch>
+        </p:blipFill>
+        <p:spPr>
+          <a:xfrm>
+            <a:off x="83617" y="68686"/>
+            <a:ext cx="811437" cy="792024"/>
+          </a:xfrm>
+          <a:prstGeom prst="rect">
+            <a:avLst/>
+          </a:prstGeom>
+        </p:spPr>
+      </p:pic>
+      <p:pic>
+        <p:nvPicPr>
+          <p:cNvPr id="9" name="Picture 8">
+            <a:extLst>
+              <a:ext uri="{FF2B5EF4-FFF2-40B4-BE49-F238E27FC236}">
+                <a16:creationId xmlns:a16="http://schemas.microsoft.com/office/drawing/2014/main" id="{C108A182-E882-F649-9105-60A469C17A4C}"/>
+              </a:ext>
+            </a:extLst>
+          </p:cNvPr>
+          <p:cNvPicPr>
+            <a:picLocks noChangeAspect="1"/>
+          </p:cNvPicPr>
+          <p:nvPr/>
+        </p:nvPicPr>
+        <p:blipFill>
+          <a:blip r:embed="rId4">
+            <a:extLst>
+              <a:ext uri="{28A0092B-C50C-407E-A947-70E740481C1C}">
+                <a14:useLocalDpi xmlns:a14="http://schemas.microsoft.com/office/drawing/2010/main" val="0"/>
+              </a:ext>
+            </a:extLst>
+          </a:blip>
+          <a:stretch>
+            <a:fillRect/>
+          </a:stretch>
+        </p:blipFill>
+        <p:spPr>
+          <a:xfrm>
+            <a:off x="11353800" y="37130"/>
+            <a:ext cx="697948" cy="823580"/>
+          </a:xfrm>
+          <a:prstGeom prst="rect">
+            <a:avLst/>
+          </a:prstGeom>
+          <a:effectLst/>
+        </p:spPr>
+      </p:pic>
+      <p:pic>
+        <p:nvPicPr>
+          <p:cNvPr id="3" name="Picture 2">
+            <a:extLst>
+              <a:ext uri="{FF2B5EF4-FFF2-40B4-BE49-F238E27FC236}">
+                <a16:creationId xmlns:a16="http://schemas.microsoft.com/office/drawing/2014/main" id="{A011C7AD-A0BA-4D34-87EE-EF9810EF81EE}"/>
+              </a:ext>
+            </a:extLst>
+          </p:cNvPr>
+          <p:cNvPicPr>
+            <a:picLocks noChangeAspect="1"/>
+          </p:cNvPicPr>
+          <p:nvPr/>
+        </p:nvPicPr>
+        <p:blipFill>
+          <a:blip r:embed="rId5">
+            <a:extLst>
+              <a:ext uri="{28A0092B-C50C-407E-A947-70E740481C1C}">
+                <a14:useLocalDpi xmlns:a14="http://schemas.microsoft.com/office/drawing/2010/main" val="0"/>
+              </a:ext>
+            </a:extLst>
+          </a:blip>
+          <a:stretch>
+            <a:fillRect/>
+          </a:stretch>
+        </p:blipFill>
+        <p:spPr>
+          <a:xfrm>
+            <a:off x="83614" y="2622103"/>
+            <a:ext cx="4026405" cy="3019804"/>
+          </a:xfrm>
+          <a:prstGeom prst="rect">
+            <a:avLst/>
+          </a:prstGeom>
+        </p:spPr>
+      </p:pic>
+      <p:pic>
+        <p:nvPicPr>
+          <p:cNvPr id="10" name="Picture 9">
+            <a:extLst>
+              <a:ext uri="{FF2B5EF4-FFF2-40B4-BE49-F238E27FC236}">
+                <a16:creationId xmlns:a16="http://schemas.microsoft.com/office/drawing/2014/main" id="{2368A9FE-1D32-4322-B358-30979C78EF00}"/>
+              </a:ext>
+            </a:extLst>
+          </p:cNvPr>
+          <p:cNvPicPr>
+            <a:picLocks noChangeAspect="1"/>
+          </p:cNvPicPr>
+          <p:nvPr/>
+        </p:nvPicPr>
+        <p:blipFill>
+          <a:blip r:embed="rId6">
+            <a:extLst>
+              <a:ext uri="{28A0092B-C50C-407E-A947-70E740481C1C}">
+                <a14:useLocalDpi xmlns:a14="http://schemas.microsoft.com/office/drawing/2010/main" val="0"/>
+              </a:ext>
+            </a:extLst>
+          </a:blip>
+          <a:stretch>
+            <a:fillRect/>
+          </a:stretch>
+        </p:blipFill>
+        <p:spPr>
+          <a:xfrm>
+            <a:off x="4110019" y="2622103"/>
+            <a:ext cx="4026405" cy="3019804"/>
+          </a:xfrm>
+          <a:prstGeom prst="rect">
+            <a:avLst/>
+          </a:prstGeom>
+        </p:spPr>
+      </p:pic>
+      <p:pic>
+        <p:nvPicPr>
+          <p:cNvPr id="13" name="Picture 12">
+            <a:extLst>
+              <a:ext uri="{FF2B5EF4-FFF2-40B4-BE49-F238E27FC236}">
+                <a16:creationId xmlns:a16="http://schemas.microsoft.com/office/drawing/2014/main" id="{67900C7F-8783-4AAE-8A0C-CA7BA993763C}"/>
+              </a:ext>
+            </a:extLst>
+          </p:cNvPr>
+          <p:cNvPicPr>
+            <a:picLocks noChangeAspect="1"/>
+          </p:cNvPicPr>
+          <p:nvPr/>
+        </p:nvPicPr>
+        <p:blipFill>
+          <a:blip r:embed="rId7">
+            <a:extLst>
+              <a:ext uri="{28A0092B-C50C-407E-A947-70E740481C1C}">
+                <a14:useLocalDpi xmlns:a14="http://schemas.microsoft.com/office/drawing/2010/main" val="0"/>
+              </a:ext>
+            </a:extLst>
+          </a:blip>
+          <a:stretch>
+            <a:fillRect/>
+          </a:stretch>
+        </p:blipFill>
+        <p:spPr>
+          <a:xfrm>
+            <a:off x="8136422" y="2622102"/>
+            <a:ext cx="4026407" cy="3019805"/>
+          </a:xfrm>
+          <a:prstGeom prst="rect">
+            <a:avLst/>
+          </a:prstGeom>
+        </p:spPr>
+      </p:pic>
+      <p:sp>
+        <p:nvSpPr>
+          <p:cNvPr id="14" name="TextBox 13">
+            <a:extLst>
+              <a:ext uri="{FF2B5EF4-FFF2-40B4-BE49-F238E27FC236}">
+                <a16:creationId xmlns:a16="http://schemas.microsoft.com/office/drawing/2014/main" id="{3AC34A7F-CD97-4F1A-BD63-B3567DA952FD}"/>
+              </a:ext>
+            </a:extLst>
+          </p:cNvPr>
+          <p:cNvSpPr txBox="1"/>
+          <p:nvPr/>
+        </p:nvSpPr>
+        <p:spPr>
+          <a:xfrm>
+            <a:off x="8849559" y="1670970"/>
+            <a:ext cx="2600131" cy="646331"/>
+          </a:xfrm>
+          <a:prstGeom prst="rect">
+            <a:avLst/>
+          </a:prstGeom>
+          <a:noFill/>
+        </p:spPr>
+        <p:txBody>
+          <a:bodyPr wrap="square" rtlCol="0">
+            <a:spAutoFit/>
+          </a:bodyPr>
+          <a:lstStyle/>
+          <a:p>
+            <a:pPr algn="ctr"/>
+            <a:r>
+              <a:rPr lang="ru-RU" dirty="0">
+                <a:latin typeface="Helvetica Neue" panose="02000503000000020004"/>
+              </a:rPr>
+              <a:t>Алгоритм поиска простых чисел</a:t>
+            </a:r>
+            <a:endParaRPr lang="ru-RU" dirty="0"/>
+          </a:p>
+        </p:txBody>
+      </p:sp>
+      <p:sp>
+        <p:nvSpPr>
+          <p:cNvPr id="20" name="TextBox 19">
+            <a:extLst>
+              <a:ext uri="{FF2B5EF4-FFF2-40B4-BE49-F238E27FC236}">
+                <a16:creationId xmlns:a16="http://schemas.microsoft.com/office/drawing/2014/main" id="{4018C14E-37F3-4970-8DBE-E04581152B8E}"/>
+              </a:ext>
+            </a:extLst>
+          </p:cNvPr>
+          <p:cNvSpPr txBox="1"/>
+          <p:nvPr/>
+        </p:nvSpPr>
+        <p:spPr>
+          <a:xfrm>
+            <a:off x="4795933" y="1670970"/>
+            <a:ext cx="2600131" cy="646331"/>
+          </a:xfrm>
+          <a:prstGeom prst="rect">
+            <a:avLst/>
+          </a:prstGeom>
+          <a:noFill/>
+        </p:spPr>
+        <p:txBody>
+          <a:bodyPr wrap="square" rtlCol="0">
+            <a:spAutoFit/>
+          </a:bodyPr>
+          <a:lstStyle/>
+          <a:p>
+            <a:pPr algn="ctr"/>
+            <a:r>
+              <a:rPr lang="ru-RU" dirty="0">
+                <a:latin typeface="Helvetica Neue" panose="02000503000000020004"/>
+              </a:rPr>
+              <a:t>Алгоритм «Быстрая сортировка»</a:t>
+            </a:r>
+            <a:endParaRPr lang="ru-RU" dirty="0"/>
+          </a:p>
+        </p:txBody>
+      </p:sp>
+      <p:sp>
+        <p:nvSpPr>
+          <p:cNvPr id="23" name="TextBox 22">
+            <a:extLst>
+              <a:ext uri="{FF2B5EF4-FFF2-40B4-BE49-F238E27FC236}">
+                <a16:creationId xmlns:a16="http://schemas.microsoft.com/office/drawing/2014/main" id="{818B9FB1-BEDB-4330-B559-C8F9F0B9189E}"/>
+              </a:ext>
+            </a:extLst>
+          </p:cNvPr>
+          <p:cNvSpPr txBox="1"/>
+          <p:nvPr/>
+        </p:nvSpPr>
+        <p:spPr>
+          <a:xfrm>
+            <a:off x="796750" y="1670970"/>
+            <a:ext cx="2600131" cy="646331"/>
+          </a:xfrm>
+          <a:prstGeom prst="rect">
+            <a:avLst/>
+          </a:prstGeom>
+          <a:noFill/>
+        </p:spPr>
+        <p:txBody>
+          <a:bodyPr wrap="square" rtlCol="0">
+            <a:spAutoFit/>
+          </a:bodyPr>
+          <a:lstStyle/>
+          <a:p>
+            <a:pPr algn="ctr"/>
+            <a:r>
+              <a:rPr lang="ru-RU" dirty="0">
+                <a:latin typeface="Helvetica Neue" panose="02000503000000020004"/>
+              </a:rPr>
+              <a:t>Алгоритм умножения матриц</a:t>
+            </a:r>
+            <a:endParaRPr lang="ru-RU" dirty="0"/>
+          </a:p>
+        </p:txBody>
+      </p:sp>
+    </p:spTree>
+    <p:extLst>
+      <p:ext uri="{BB962C8B-B14F-4D97-AF65-F5344CB8AC3E}">
+        <p14:creationId xmlns:p14="http://schemas.microsoft.com/office/powerpoint/2010/main" val="1002887355"/>
+      </p:ext>
+    </p:extLst>
+  </p:cSld>
+  <p:clrMapOvr>
+    <a:masterClrMapping/>
+  </p:clrMapOvr>
+</p:sld>
+</file>
+
+<file path=ppt/slides/slide13.xml><?xml version="1.0" encoding="utf-8"?>
+<p:sld xmlns:a="http://schemas.openxmlformats.org/drawingml/2006/main" xmlns:r="http://schemas.openxmlformats.org/officeDocument/2006/relationships" xmlns:p="http://schemas.openxmlformats.org/presentationml/2006/main">
+  <p:cSld>
+    <p:spTree>
+      <p:nvGrpSpPr>
+        <p:cNvPr id="1" name=""/>
+        <p:cNvGrpSpPr/>
+        <p:nvPr/>
+      </p:nvGrpSpPr>
+      <p:grpSpPr>
+        <a:xfrm>
+          <a:off x="0" y="0"/>
+          <a:ext cx="0" cy="0"/>
+          <a:chOff x="0" y="0"/>
+          <a:chExt cx="0" cy="0"/>
+        </a:xfrm>
+      </p:grpSpPr>
+      <p:sp>
+        <p:nvSpPr>
+          <p:cNvPr id="5" name="Slide Number Placeholder 4">
+            <a:extLst>
+              <a:ext uri="{FF2B5EF4-FFF2-40B4-BE49-F238E27FC236}">
+                <a16:creationId xmlns:a16="http://schemas.microsoft.com/office/drawing/2014/main" id="{FA23F4B6-34F6-5F49-8575-0B830127F0BA}"/>
+              </a:ext>
+            </a:extLst>
+          </p:cNvPr>
+          <p:cNvSpPr>
+            <a:spLocks noGrp="1"/>
+          </p:cNvSpPr>
+          <p:nvPr>
+            <p:ph type="sldNum" sz="quarter" idx="12"/>
+          </p:nvPr>
+        </p:nvSpPr>
+        <p:spPr/>
+        <p:txBody>
+          <a:bodyPr/>
+          <a:lstStyle/>
+          <a:p>
+            <a:fld id="{018BF65D-6ED2-4CD5-9A43-7F793B06593C}" type="slidenum">
+              <a:rPr lang="ru-RU" smtClean="0"/>
+              <a:t>13</a:t>
+            </a:fld>
+            <a:endParaRPr lang="ru-RU"/>
+          </a:p>
+        </p:txBody>
+      </p:sp>
+      <p:sp>
+        <p:nvSpPr>
+          <p:cNvPr id="7" name="Заголовок 1">
+            <a:extLst>
+              <a:ext uri="{FF2B5EF4-FFF2-40B4-BE49-F238E27FC236}">
+                <a16:creationId xmlns:a16="http://schemas.microsoft.com/office/drawing/2014/main" id="{C97D02F3-B3CF-1A40-992B-3BCE54AEC322}"/>
+              </a:ext>
+            </a:extLst>
+          </p:cNvPr>
+          <p:cNvSpPr txBox="1">
+            <a:spLocks/>
+          </p:cNvSpPr>
+          <p:nvPr/>
+        </p:nvSpPr>
+        <p:spPr>
+          <a:xfrm>
+            <a:off x="-1" y="-16805"/>
+            <a:ext cx="12192001" cy="941202"/>
+          </a:xfrm>
+          <a:prstGeom prst="rect">
+            <a:avLst/>
+          </a:prstGeom>
+          <a:solidFill>
+            <a:schemeClr val="accent3">
+              <a:lumMod val="20000"/>
+              <a:lumOff val="80000"/>
+            </a:schemeClr>
+          </a:solidFill>
+        </p:spPr>
+        <p:txBody>
+          <a:bodyPr vert="horz" lIns="91440" tIns="45720" rIns="91440" bIns="45720" rtlCol="0" anchor="ctr">
+            <a:normAutofit/>
+          </a:bodyPr>
+          <a:lstStyle>
+            <a:lvl1pPr algn="l" defTabSz="914400" rtl="0" eaLnBrk="1" latinLnBrk="0" hangingPunct="1">
+              <a:lnSpc>
+                <a:spcPct val="90000"/>
+              </a:lnSpc>
+              <a:spcBef>
+                <a:spcPct val="0"/>
+              </a:spcBef>
+              <a:buNone/>
+              <a:defRPr sz="4400" kern="1200">
+                <a:solidFill>
+                  <a:schemeClr val="tx1"/>
+                </a:solidFill>
+                <a:latin typeface="+mj-lt"/>
+                <a:ea typeface="+mj-ea"/>
+                <a:cs typeface="+mj-cs"/>
+              </a:defRPr>
+            </a:lvl1pPr>
+          </a:lstStyle>
+          <a:p>
+            <a:r>
+              <a:rPr lang="en-US" b="1" dirty="0">
+                <a:latin typeface="+mn-lt"/>
+              </a:rPr>
+              <a:t>	</a:t>
+            </a:r>
+            <a:r>
+              <a:rPr lang="ru-RU" b="1" dirty="0">
+                <a:latin typeface="+mn-lt"/>
+              </a:rPr>
+              <a:t>Заключение</a:t>
+            </a:r>
+          </a:p>
+        </p:txBody>
+      </p:sp>
+      <p:pic>
+        <p:nvPicPr>
+          <p:cNvPr id="8" name="Picture 7">
+            <a:extLst>
+              <a:ext uri="{FF2B5EF4-FFF2-40B4-BE49-F238E27FC236}">
+                <a16:creationId xmlns:a16="http://schemas.microsoft.com/office/drawing/2014/main" id="{E865F144-5406-EF47-B91B-14B125A33E9F}"/>
+              </a:ext>
+            </a:extLst>
+          </p:cNvPr>
+          <p:cNvPicPr>
+            <a:picLocks noChangeAspect="1"/>
+          </p:cNvPicPr>
+          <p:nvPr/>
+        </p:nvPicPr>
+        <p:blipFill>
+          <a:blip r:embed="rId3">
+            <a:extLst>
+              <a:ext uri="{28A0092B-C50C-407E-A947-70E740481C1C}">
+                <a14:useLocalDpi xmlns:a14="http://schemas.microsoft.com/office/drawing/2010/main" val="0"/>
+              </a:ext>
+            </a:extLst>
+          </a:blip>
+          <a:stretch>
+            <a:fillRect/>
+          </a:stretch>
+        </p:blipFill>
+        <p:spPr>
+          <a:xfrm>
+            <a:off x="83617" y="68686"/>
+            <a:ext cx="811437" cy="792024"/>
+          </a:xfrm>
+          <a:prstGeom prst="rect">
+            <a:avLst/>
+          </a:prstGeom>
+        </p:spPr>
+      </p:pic>
+      <p:pic>
+        <p:nvPicPr>
+          <p:cNvPr id="9" name="Picture 8">
+            <a:extLst>
+              <a:ext uri="{FF2B5EF4-FFF2-40B4-BE49-F238E27FC236}">
+                <a16:creationId xmlns:a16="http://schemas.microsoft.com/office/drawing/2014/main" id="{086CDF8B-5A30-8C4F-B34E-4275A0D98BC9}"/>
+              </a:ext>
+            </a:extLst>
+          </p:cNvPr>
+          <p:cNvPicPr>
+            <a:picLocks noChangeAspect="1"/>
+          </p:cNvPicPr>
+          <p:nvPr/>
+        </p:nvPicPr>
+        <p:blipFill>
+          <a:blip r:embed="rId4">
+            <a:extLst>
+              <a:ext uri="{28A0092B-C50C-407E-A947-70E740481C1C}">
+                <a14:useLocalDpi xmlns:a14="http://schemas.microsoft.com/office/drawing/2010/main" val="0"/>
+              </a:ext>
+            </a:extLst>
+          </a:blip>
+          <a:stretch>
+            <a:fillRect/>
+          </a:stretch>
+        </p:blipFill>
+        <p:spPr>
+          <a:xfrm>
+            <a:off x="11353800" y="37130"/>
+            <a:ext cx="697948" cy="823580"/>
+          </a:xfrm>
+          <a:prstGeom prst="rect">
+            <a:avLst/>
+          </a:prstGeom>
+          <a:effectLst/>
+        </p:spPr>
+      </p:pic>
+      <p:sp>
+        <p:nvSpPr>
+          <p:cNvPr id="4" name="Content Placeholder 3">
+            <a:extLst>
+              <a:ext uri="{FF2B5EF4-FFF2-40B4-BE49-F238E27FC236}">
+                <a16:creationId xmlns:a16="http://schemas.microsoft.com/office/drawing/2014/main" id="{B5864989-CF3D-4AA0-88E2-0C0B8B6D17BC}"/>
+              </a:ext>
+            </a:extLst>
+          </p:cNvPr>
+          <p:cNvSpPr>
+            <a:spLocks noGrp="1"/>
+          </p:cNvSpPr>
+          <p:nvPr>
+            <p:ph idx="1"/>
+          </p:nvPr>
+        </p:nvSpPr>
+        <p:spPr/>
+        <p:txBody>
+          <a:bodyPr/>
+          <a:lstStyle/>
+          <a:p>
+            <a:endParaRPr lang="ru-RU"/>
+          </a:p>
+        </p:txBody>
+      </p:sp>
+    </p:spTree>
+    <p:extLst>
+      <p:ext uri="{BB962C8B-B14F-4D97-AF65-F5344CB8AC3E}">
+        <p14:creationId xmlns:p14="http://schemas.microsoft.com/office/powerpoint/2010/main" val="4066101104"/>
+      </p:ext>
+    </p:extLst>
+  </p:cSld>
+  <p:clrMapOvr>
+    <a:masterClrMapping/>
+  </p:clrMapOvr>
+</p:sld>
+</file>
+
+<file path=ppt/slides/slide14.xml><?xml version="1.0" encoding="utf-8"?>
+<p:sld xmlns:a="http://schemas.openxmlformats.org/drawingml/2006/main" xmlns:r="http://schemas.openxmlformats.org/officeDocument/2006/relationships" xmlns:p="http://schemas.openxmlformats.org/presentationml/2006/main">
+  <p:cSld>
+    <p:spTree>
+      <p:nvGrpSpPr>
+        <p:cNvPr id="1" name=""/>
+        <p:cNvGrpSpPr/>
+        <p:nvPr/>
+      </p:nvGrpSpPr>
+      <p:grpSpPr>
+        <a:xfrm>
+          <a:off x="0" y="0"/>
+          <a:ext cx="0" cy="0"/>
+          <a:chOff x="0" y="0"/>
+          <a:chExt cx="0" cy="0"/>
+        </a:xfrm>
+      </p:grpSpPr>
+      <p:sp>
+        <p:nvSpPr>
+          <p:cNvPr id="5" name="Slide Number Placeholder 4">
+            <a:extLst>
+              <a:ext uri="{FF2B5EF4-FFF2-40B4-BE49-F238E27FC236}">
+                <a16:creationId xmlns:a16="http://schemas.microsoft.com/office/drawing/2014/main" id="{AAE0A73A-0DF3-3A44-813D-3A4A08C1D621}"/>
+              </a:ext>
+            </a:extLst>
+          </p:cNvPr>
+          <p:cNvSpPr>
+            <a:spLocks noGrp="1"/>
+          </p:cNvSpPr>
+          <p:nvPr>
+            <p:ph type="sldNum" sz="quarter" idx="12"/>
+          </p:nvPr>
+        </p:nvSpPr>
+        <p:spPr/>
+        <p:txBody>
+          <a:bodyPr/>
+          <a:lstStyle/>
+          <a:p>
+            <a:fld id="{018BF65D-6ED2-4CD5-9A43-7F793B06593C}" type="slidenum">
+              <a:rPr lang="ru-RU" smtClean="0"/>
+              <a:t>14</a:t>
             </a:fld>
             <a:endParaRPr lang="ru-RU"/>
           </a:p>

</xml_diff>